<commit_message>
update the project progress
</commit_message>
<xml_diff>
--- a/week2/Dissertation_2.pptx
+++ b/week2/Dissertation_2.pptx
@@ -4547,7 +4547,7 @@
         </p:blipFill>
         <p:spPr bwMode="auto">
           <a:xfrm>
-            <a:off x="686873" y="944629"/>
+            <a:off x="-11185" y="921249"/>
             <a:ext cx="7145547" cy="1770570"/>
           </a:xfrm>
           <a:prstGeom prst="rect">
@@ -4579,7 +4579,7 @@
         </p:nvSpPr>
         <p:spPr>
           <a:xfrm>
-            <a:off x="4655898" y="2715199"/>
+            <a:off x="3615663" y="2715199"/>
             <a:ext cx="435771" cy="447231"/>
           </a:xfrm>
           <a:prstGeom prst="downArrow">
@@ -4640,7 +4640,7 @@
         </p:blipFill>
         <p:spPr bwMode="auto">
           <a:xfrm>
-            <a:off x="1492166" y="3162824"/>
+            <a:off x="451931" y="3162824"/>
             <a:ext cx="6506015" cy="1158037"/>
           </a:xfrm>
           <a:prstGeom prst="rect">
@@ -4687,7 +4687,7 @@
         </p:blipFill>
         <p:spPr bwMode="auto">
           <a:xfrm>
-            <a:off x="1405883" y="4104835"/>
+            <a:off x="365648" y="4104835"/>
             <a:ext cx="5561587" cy="2608759"/>
           </a:xfrm>
           <a:prstGeom prst="rect">
@@ -4705,6 +4705,337 @@
           </a:extLst>
         </p:spPr>
       </p:pic>
+      <p:sp>
+        <p:nvSpPr>
+          <p:cNvPr id="3" name="文本占位符 3">
+            <a:extLst>
+              <a:ext uri="{FF2B5EF4-FFF2-40B4-BE49-F238E27FC236}">
+                <a16:creationId xmlns:a16="http://schemas.microsoft.com/office/drawing/2014/main" id="{1DE1592D-9A8B-1957-3CF9-13FB0133DB96}"/>
+              </a:ext>
+            </a:extLst>
+          </p:cNvPr>
+          <p:cNvSpPr txBox="1">
+            <a:spLocks/>
+          </p:cNvSpPr>
+          <p:nvPr/>
+        </p:nvSpPr>
+        <p:spPr>
+          <a:xfrm>
+            <a:off x="7039635" y="1073892"/>
+            <a:ext cx="4913032" cy="5532437"/>
+          </a:xfrm>
+          <a:prstGeom prst="rect">
+            <a:avLst/>
+          </a:prstGeom>
+        </p:spPr>
+        <p:txBody>
+          <a:bodyPr vert="horz" lIns="91440" tIns="45720" rIns="91440" bIns="45720" rtlCol="0">
+            <a:normAutofit/>
+          </a:bodyPr>
+          <a:lstStyle>
+            <a:lvl1pPr marL="228600" indent="-228600" algn="l" defTabSz="914400" rtl="0" eaLnBrk="1" latinLnBrk="0" hangingPunct="1">
+              <a:lnSpc>
+                <a:spcPct val="90000"/>
+              </a:lnSpc>
+              <a:spcBef>
+                <a:spcPts val="1000"/>
+              </a:spcBef>
+              <a:buFont typeface="Arial" panose="020B0604020202020204" pitchFamily="34" charset="0"/>
+              <a:buChar char="•"/>
+              <a:defRPr sz="2800" kern="1200">
+                <a:solidFill>
+                  <a:schemeClr val="tx1"/>
+                </a:solidFill>
+                <a:latin typeface="+mn-lt"/>
+                <a:ea typeface="+mn-ea"/>
+                <a:cs typeface="+mn-cs"/>
+              </a:defRPr>
+            </a:lvl1pPr>
+            <a:lvl2pPr marL="685800" indent="-228600" algn="l" defTabSz="914400" rtl="0" eaLnBrk="1" latinLnBrk="0" hangingPunct="1">
+              <a:lnSpc>
+                <a:spcPct val="90000"/>
+              </a:lnSpc>
+              <a:spcBef>
+                <a:spcPts val="500"/>
+              </a:spcBef>
+              <a:buFont typeface="Arial" panose="020B0604020202020204" pitchFamily="34" charset="0"/>
+              <a:buChar char="•"/>
+              <a:defRPr sz="2400" kern="1200">
+                <a:solidFill>
+                  <a:schemeClr val="tx1"/>
+                </a:solidFill>
+                <a:latin typeface="+mn-lt"/>
+                <a:ea typeface="+mn-ea"/>
+                <a:cs typeface="+mn-cs"/>
+              </a:defRPr>
+            </a:lvl2pPr>
+            <a:lvl3pPr marL="1143000" indent="-228600" algn="l" defTabSz="914400" rtl="0" eaLnBrk="1" latinLnBrk="0" hangingPunct="1">
+              <a:lnSpc>
+                <a:spcPct val="90000"/>
+              </a:lnSpc>
+              <a:spcBef>
+                <a:spcPts val="500"/>
+              </a:spcBef>
+              <a:buFont typeface="Arial" panose="020B0604020202020204" pitchFamily="34" charset="0"/>
+              <a:buChar char="•"/>
+              <a:defRPr sz="2000" kern="1200">
+                <a:solidFill>
+                  <a:schemeClr val="tx1"/>
+                </a:solidFill>
+                <a:latin typeface="+mn-lt"/>
+                <a:ea typeface="+mn-ea"/>
+                <a:cs typeface="+mn-cs"/>
+              </a:defRPr>
+            </a:lvl3pPr>
+            <a:lvl4pPr marL="1600200" indent="-228600" algn="l" defTabSz="914400" rtl="0" eaLnBrk="1" latinLnBrk="0" hangingPunct="1">
+              <a:lnSpc>
+                <a:spcPct val="90000"/>
+              </a:lnSpc>
+              <a:spcBef>
+                <a:spcPts val="500"/>
+              </a:spcBef>
+              <a:buFont typeface="Arial" panose="020B0604020202020204" pitchFamily="34" charset="0"/>
+              <a:buChar char="•"/>
+              <a:defRPr sz="1800" kern="1200">
+                <a:solidFill>
+                  <a:schemeClr val="tx1"/>
+                </a:solidFill>
+                <a:latin typeface="+mn-lt"/>
+                <a:ea typeface="+mn-ea"/>
+                <a:cs typeface="+mn-cs"/>
+              </a:defRPr>
+            </a:lvl4pPr>
+            <a:lvl5pPr marL="2057400" indent="-228600" algn="l" defTabSz="914400" rtl="0" eaLnBrk="1" latinLnBrk="0" hangingPunct="1">
+              <a:lnSpc>
+                <a:spcPct val="90000"/>
+              </a:lnSpc>
+              <a:spcBef>
+                <a:spcPts val="500"/>
+              </a:spcBef>
+              <a:buFont typeface="Arial" panose="020B0604020202020204" pitchFamily="34" charset="0"/>
+              <a:buChar char="•"/>
+              <a:defRPr sz="1800" kern="1200">
+                <a:solidFill>
+                  <a:schemeClr val="tx1"/>
+                </a:solidFill>
+                <a:latin typeface="+mn-lt"/>
+                <a:ea typeface="+mn-ea"/>
+                <a:cs typeface="+mn-cs"/>
+              </a:defRPr>
+            </a:lvl5pPr>
+            <a:lvl6pPr marL="2514600" indent="-228600" algn="l" defTabSz="914400" rtl="0" eaLnBrk="1" latinLnBrk="0" hangingPunct="1">
+              <a:lnSpc>
+                <a:spcPct val="90000"/>
+              </a:lnSpc>
+              <a:spcBef>
+                <a:spcPts val="500"/>
+              </a:spcBef>
+              <a:buFont typeface="Arial" panose="020B0604020202020204" pitchFamily="34" charset="0"/>
+              <a:buChar char="•"/>
+              <a:defRPr sz="1800" kern="1200">
+                <a:solidFill>
+                  <a:schemeClr val="tx1"/>
+                </a:solidFill>
+                <a:latin typeface="+mn-lt"/>
+                <a:ea typeface="+mn-ea"/>
+                <a:cs typeface="+mn-cs"/>
+              </a:defRPr>
+            </a:lvl6pPr>
+            <a:lvl7pPr marL="2971800" indent="-228600" algn="l" defTabSz="914400" rtl="0" eaLnBrk="1" latinLnBrk="0" hangingPunct="1">
+              <a:lnSpc>
+                <a:spcPct val="90000"/>
+              </a:lnSpc>
+              <a:spcBef>
+                <a:spcPts val="500"/>
+              </a:spcBef>
+              <a:buFont typeface="Arial" panose="020B0604020202020204" pitchFamily="34" charset="0"/>
+              <a:buChar char="•"/>
+              <a:defRPr sz="1800" kern="1200">
+                <a:solidFill>
+                  <a:schemeClr val="tx1"/>
+                </a:solidFill>
+                <a:latin typeface="+mn-lt"/>
+                <a:ea typeface="+mn-ea"/>
+                <a:cs typeface="+mn-cs"/>
+              </a:defRPr>
+            </a:lvl7pPr>
+            <a:lvl8pPr marL="3429000" indent="-228600" algn="l" defTabSz="914400" rtl="0" eaLnBrk="1" latinLnBrk="0" hangingPunct="1">
+              <a:lnSpc>
+                <a:spcPct val="90000"/>
+              </a:lnSpc>
+              <a:spcBef>
+                <a:spcPts val="500"/>
+              </a:spcBef>
+              <a:buFont typeface="Arial" panose="020B0604020202020204" pitchFamily="34" charset="0"/>
+              <a:buChar char="•"/>
+              <a:defRPr sz="1800" kern="1200">
+                <a:solidFill>
+                  <a:schemeClr val="tx1"/>
+                </a:solidFill>
+                <a:latin typeface="+mn-lt"/>
+                <a:ea typeface="+mn-ea"/>
+                <a:cs typeface="+mn-cs"/>
+              </a:defRPr>
+            </a:lvl8pPr>
+            <a:lvl9pPr marL="3886200" indent="-228600" algn="l" defTabSz="914400" rtl="0" eaLnBrk="1" latinLnBrk="0" hangingPunct="1">
+              <a:lnSpc>
+                <a:spcPct val="90000"/>
+              </a:lnSpc>
+              <a:spcBef>
+                <a:spcPts val="500"/>
+              </a:spcBef>
+              <a:buFont typeface="Arial" panose="020B0604020202020204" pitchFamily="34" charset="0"/>
+              <a:buChar char="•"/>
+              <a:defRPr sz="1800" kern="1200">
+                <a:solidFill>
+                  <a:schemeClr val="tx1"/>
+                </a:solidFill>
+                <a:latin typeface="+mn-lt"/>
+                <a:ea typeface="+mn-ea"/>
+                <a:cs typeface="+mn-cs"/>
+              </a:defRPr>
+            </a:lvl9pPr>
+          </a:lstStyle>
+          <a:p>
+            <a:pPr marL="0" indent="0">
+              <a:buNone/>
+            </a:pPr>
+            <a:r>
+              <a:rPr lang="en-US" altLang="zh-CN" dirty="0">
+                <a:solidFill>
+                  <a:srgbClr val="1F2328"/>
+                </a:solidFill>
+                <a:latin typeface="-apple-system"/>
+              </a:rPr>
+              <a:t>Original:</a:t>
+            </a:r>
+          </a:p>
+          <a:p>
+            <a:pPr marL="0" indent="0">
+              <a:buNone/>
+            </a:pPr>
+            <a:r>
+              <a:rPr lang="en-US" altLang="zh-CN" dirty="0">
+                <a:solidFill>
+                  <a:srgbClr val="1F2328"/>
+                </a:solidFill>
+                <a:latin typeface="-apple-system"/>
+              </a:rPr>
+              <a:t>Avg seq Length</a:t>
+            </a:r>
+            <a:r>
+              <a:rPr lang="en-US" altLang="zh-CN">
+                <a:solidFill>
+                  <a:srgbClr val="1F2328"/>
+                </a:solidFill>
+                <a:latin typeface="-apple-system"/>
+              </a:rPr>
+              <a:t>: 163.50</a:t>
+            </a:r>
+            <a:endParaRPr lang="en-US" altLang="zh-CN" dirty="0">
+              <a:solidFill>
+                <a:srgbClr val="1F2328"/>
+              </a:solidFill>
+              <a:latin typeface="-apple-system"/>
+            </a:endParaRPr>
+          </a:p>
+          <a:p>
+            <a:pPr marL="0" indent="0">
+              <a:buNone/>
+            </a:pPr>
+            <a:r>
+              <a:rPr lang="en-US" altLang="zh-CN" dirty="0">
+                <a:solidFill>
+                  <a:srgbClr val="1F2328"/>
+                </a:solidFill>
+                <a:latin typeface="-apple-system"/>
+              </a:rPr>
+              <a:t>Num of training data: 6040</a:t>
+            </a:r>
+          </a:p>
+          <a:p>
+            <a:pPr marL="0" indent="0">
+              <a:buNone/>
+            </a:pPr>
+            <a:r>
+              <a:rPr lang="en-US" altLang="zh-CN" dirty="0">
+                <a:solidFill>
+                  <a:srgbClr val="1F2328"/>
+                </a:solidFill>
+                <a:latin typeface="-apple-system"/>
+              </a:rPr>
+              <a:t>Num of items: 3416</a:t>
+            </a:r>
+          </a:p>
+          <a:p>
+            <a:pPr marL="0" indent="0">
+              <a:buNone/>
+            </a:pPr>
+            <a:endParaRPr lang="en-US" altLang="zh-CN" dirty="0">
+              <a:solidFill>
+                <a:srgbClr val="1F2328"/>
+              </a:solidFill>
+              <a:latin typeface="-apple-system"/>
+            </a:endParaRPr>
+          </a:p>
+          <a:p>
+            <a:pPr marL="0" indent="0">
+              <a:buNone/>
+            </a:pPr>
+            <a:r>
+              <a:rPr lang="en-US" altLang="zh-CN" dirty="0">
+                <a:solidFill>
+                  <a:srgbClr val="1F2328"/>
+                </a:solidFill>
+                <a:latin typeface="-apple-system"/>
+              </a:rPr>
+              <a:t>Modified:</a:t>
+            </a:r>
+          </a:p>
+          <a:p>
+            <a:pPr marL="0" indent="0">
+              <a:buNone/>
+            </a:pPr>
+            <a:r>
+              <a:rPr lang="en-US" altLang="zh-CN" dirty="0">
+                <a:solidFill>
+                  <a:srgbClr val="1F2328"/>
+                </a:solidFill>
+                <a:latin typeface="-apple-system"/>
+              </a:rPr>
+              <a:t>Avg seq Length: 185.46</a:t>
+            </a:r>
+          </a:p>
+          <a:p>
+            <a:pPr marL="0" indent="0">
+              <a:buNone/>
+            </a:pPr>
+            <a:r>
+              <a:rPr lang="en-US" altLang="zh-CN" dirty="0">
+                <a:solidFill>
+                  <a:srgbClr val="1F2328"/>
+                </a:solidFill>
+                <a:latin typeface="-apple-system"/>
+              </a:rPr>
+              <a:t>Num of training data: 121919</a:t>
+            </a:r>
+          </a:p>
+          <a:p>
+            <a:pPr marL="0" indent="0">
+              <a:buNone/>
+            </a:pPr>
+            <a:r>
+              <a:rPr lang="en-US" altLang="zh-CN" dirty="0">
+                <a:solidFill>
+                  <a:srgbClr val="1F2328"/>
+                </a:solidFill>
+                <a:latin typeface="-apple-system"/>
+              </a:rPr>
+              <a:t>Num of items: 3416</a:t>
+            </a:r>
+          </a:p>
+        </p:txBody>
+      </p:sp>
     </p:spTree>
     <p:extLst>
       <p:ext uri="{BB962C8B-B14F-4D97-AF65-F5344CB8AC3E}">

</xml_diff>